<commit_message>
更新 20240601 报告 PPT
</commit_message>
<xml_diff>
--- a/presentation/操作系统异步与任务调度机制研究.pptx
+++ b/presentation/操作系统异步与任务调度机制研究.pptx
@@ -15931,6 +15931,36 @@
           <a:chExt cx="0" cy="0"/>
         </a:xfrm>
       </p:grpSpPr>
+      <p:pic>
+        <p:nvPicPr>
+          <p:cNvPr id="3" name="图片 2">
+            <a:extLst>
+              <a:ext uri="{FF2B5EF4-FFF2-40B4-BE49-F238E27FC236}">
+                <a16:creationId xmlns:a16="http://schemas.microsoft.com/office/drawing/2014/main" id="{6FBE91FB-8D17-6C6E-1BF2-EDEA767C1D07}"/>
+              </a:ext>
+            </a:extLst>
+          </p:cNvPr>
+          <p:cNvPicPr>
+            <a:picLocks noChangeAspect="1"/>
+          </p:cNvPicPr>
+          <p:nvPr/>
+        </p:nvPicPr>
+        <p:blipFill>
+          <a:blip r:embed="rId3"/>
+          <a:stretch>
+            <a:fillRect/>
+          </a:stretch>
+        </p:blipFill>
+        <p:spPr>
+          <a:xfrm>
+            <a:off x="835306" y="3302365"/>
+            <a:ext cx="6459962" cy="2051589"/>
+          </a:xfrm>
+          <a:prstGeom prst="rect">
+            <a:avLst/>
+          </a:prstGeom>
+        </p:spPr>
+      </p:pic>
       <p:sp>
         <p:nvSpPr>
           <p:cNvPr id="6" name="标题 5">
@@ -16204,36 +16234,6 @@
           </a:p>
         </p:txBody>
       </p:sp>
-      <p:pic>
-        <p:nvPicPr>
-          <p:cNvPr id="5" name="图片 4">
-            <a:extLst>
-              <a:ext uri="{FF2B5EF4-FFF2-40B4-BE49-F238E27FC236}">
-                <a16:creationId xmlns:a16="http://schemas.microsoft.com/office/drawing/2014/main" id="{1EDC084A-D8F8-72E9-324F-6B9870613C40}"/>
-              </a:ext>
-            </a:extLst>
-          </p:cNvPr>
-          <p:cNvPicPr>
-            <a:picLocks noChangeAspect="1"/>
-          </p:cNvPicPr>
-          <p:nvPr/>
-        </p:nvPicPr>
-        <p:blipFill>
-          <a:blip r:embed="rId3"/>
-          <a:stretch>
-            <a:fillRect/>
-          </a:stretch>
-        </p:blipFill>
-        <p:spPr>
-          <a:xfrm>
-            <a:off x="835306" y="3293807"/>
-            <a:ext cx="6423775" cy="2040097"/>
-          </a:xfrm>
-          <a:prstGeom prst="rect">
-            <a:avLst/>
-          </a:prstGeom>
-        </p:spPr>
-      </p:pic>
       <p:pic>
         <p:nvPicPr>
           <p:cNvPr id="9" name="图片 8">

</xml_diff>